<commit_message>
docs: DevSecOps Pipeline extended for CloudWatch, Lambda and JIRA
</commit_message>
<xml_diff>
--- a/submission/DevOpsPipeline.pptx
+++ b/submission/DevOpsPipeline.pptx
@@ -8,7 +8,7 @@
     <p:sldId id="256" r:id="rId3"/>
   </p:sldIdLst>
   <p:sldSz cx="9144000" cy="5143500"/>
-  <p:notesSz cx="6858000" cy="9144000"/>
+  <p:notesSz cx="7559675" cy="10691812"/>
 </p:presentation>
 </file>
 
@@ -53,7 +53,7 @@
       </p:grpSpPr>
       <p:sp>
         <p:nvSpPr>
-          <p:cNvPr id="24" name="PlaceHolder 1"/>
+          <p:cNvPr id="22" name="PlaceHolder 1"/>
           <p:cNvSpPr>
             <a:spLocks noGrp="1"/>
           </p:cNvSpPr>
@@ -64,7 +64,7 @@
         <p:spPr>
           <a:xfrm>
             <a:off x="311760" y="744480"/>
-            <a:ext cx="8520120" cy="2052360"/>
+            <a:ext cx="8519760" cy="2052000"/>
           </a:xfrm>
           <a:prstGeom prst="rect">
             <a:avLst/>
@@ -75,18 +75,16 @@
             <a:noAutofit/>
           </a:bodyPr>
           <a:p>
-            <a:endParaRPr b="0" lang="de-DE" sz="1400" spc="-1" strike="noStrike">
-              <a:solidFill>
-                <a:srgbClr val="000000"/>
-              </a:solidFill>
-              <a:latin typeface="Arial"/>
-            </a:endParaRPr>
-          </a:p>
-        </p:txBody>
-      </p:sp>
-      <p:sp>
-        <p:nvSpPr>
-          <p:cNvPr id="25" name="PlaceHolder 2"/>
+            <a:pPr algn="ctr"/>
+            <a:endParaRPr b="0" lang="de-DE" sz="4400" spc="-1" strike="noStrike">
+              <a:latin typeface="Arial"/>
+            </a:endParaRPr>
+          </a:p>
+        </p:txBody>
+      </p:sp>
+      <p:sp>
+        <p:nvSpPr>
+          <p:cNvPr id="23" name="PlaceHolder 2"/>
           <p:cNvSpPr>
             <a:spLocks noGrp="1"/>
           </p:cNvSpPr>
@@ -108,18 +106,15 @@
             <a:normAutofit/>
           </a:bodyPr>
           <a:p>
-            <a:endParaRPr b="0" lang="de-DE" sz="1400" spc="-1" strike="noStrike">
-              <a:solidFill>
-                <a:srgbClr val="000000"/>
-              </a:solidFill>
-              <a:latin typeface="Arial"/>
-            </a:endParaRPr>
-          </a:p>
-        </p:txBody>
-      </p:sp>
-      <p:sp>
-        <p:nvSpPr>
-          <p:cNvPr id="26" name="PlaceHolder 3"/>
+            <a:endParaRPr b="0" lang="de-DE" sz="3200" spc="-1" strike="noStrike">
+              <a:latin typeface="Arial"/>
+            </a:endParaRPr>
+          </a:p>
+        </p:txBody>
+      </p:sp>
+      <p:sp>
+        <p:nvSpPr>
+          <p:cNvPr id="24" name="PlaceHolder 3"/>
           <p:cNvSpPr>
             <a:spLocks noGrp="1"/>
           </p:cNvSpPr>
@@ -141,10 +136,7 @@
             <a:normAutofit/>
           </a:bodyPr>
           <a:p>
-            <a:endParaRPr b="0" lang="de-DE" sz="1400" spc="-1" strike="noStrike">
-              <a:solidFill>
-                <a:srgbClr val="000000"/>
-              </a:solidFill>
+            <a:endParaRPr b="0" lang="de-DE" sz="3200" spc="-1" strike="noStrike">
               <a:latin typeface="Arial"/>
             </a:endParaRPr>
           </a:p>
@@ -174,7 +166,7 @@
       </p:grpSpPr>
       <p:sp>
         <p:nvSpPr>
-          <p:cNvPr id="27" name="PlaceHolder 1"/>
+          <p:cNvPr id="25" name="PlaceHolder 1"/>
           <p:cNvSpPr>
             <a:spLocks noGrp="1"/>
           </p:cNvSpPr>
@@ -185,7 +177,7 @@
         <p:spPr>
           <a:xfrm>
             <a:off x="311760" y="744480"/>
-            <a:ext cx="8520120" cy="2052360"/>
+            <a:ext cx="8519760" cy="2052000"/>
           </a:xfrm>
           <a:prstGeom prst="rect">
             <a:avLst/>
@@ -196,18 +188,16 @@
             <a:noAutofit/>
           </a:bodyPr>
           <a:p>
-            <a:endParaRPr b="0" lang="de-DE" sz="1400" spc="-1" strike="noStrike">
-              <a:solidFill>
-                <a:srgbClr val="000000"/>
-              </a:solidFill>
-              <a:latin typeface="Arial"/>
-            </a:endParaRPr>
-          </a:p>
-        </p:txBody>
-      </p:sp>
-      <p:sp>
-        <p:nvSpPr>
-          <p:cNvPr id="28" name="PlaceHolder 2"/>
+            <a:pPr algn="ctr"/>
+            <a:endParaRPr b="0" lang="de-DE" sz="4400" spc="-1" strike="noStrike">
+              <a:latin typeface="Arial"/>
+            </a:endParaRPr>
+          </a:p>
+        </p:txBody>
+      </p:sp>
+      <p:sp>
+        <p:nvSpPr>
+          <p:cNvPr id="26" name="PlaceHolder 2"/>
           <p:cNvSpPr>
             <a:spLocks noGrp="1"/>
           </p:cNvSpPr>
@@ -229,18 +219,15 @@
             <a:normAutofit/>
           </a:bodyPr>
           <a:p>
-            <a:endParaRPr b="0" lang="de-DE" sz="1400" spc="-1" strike="noStrike">
-              <a:solidFill>
-                <a:srgbClr val="000000"/>
-              </a:solidFill>
-              <a:latin typeface="Arial"/>
-            </a:endParaRPr>
-          </a:p>
-        </p:txBody>
-      </p:sp>
-      <p:sp>
-        <p:nvSpPr>
-          <p:cNvPr id="29" name="PlaceHolder 3"/>
+            <a:endParaRPr b="0" lang="de-DE" sz="3200" spc="-1" strike="noStrike">
+              <a:latin typeface="Arial"/>
+            </a:endParaRPr>
+          </a:p>
+        </p:txBody>
+      </p:sp>
+      <p:sp>
+        <p:nvSpPr>
+          <p:cNvPr id="27" name="PlaceHolder 3"/>
           <p:cNvSpPr>
             <a:spLocks noGrp="1"/>
           </p:cNvSpPr>
@@ -262,18 +249,15 @@
             <a:normAutofit/>
           </a:bodyPr>
           <a:p>
-            <a:endParaRPr b="0" lang="de-DE" sz="1400" spc="-1" strike="noStrike">
-              <a:solidFill>
-                <a:srgbClr val="000000"/>
-              </a:solidFill>
-              <a:latin typeface="Arial"/>
-            </a:endParaRPr>
-          </a:p>
-        </p:txBody>
-      </p:sp>
-      <p:sp>
-        <p:nvSpPr>
-          <p:cNvPr id="30" name="PlaceHolder 4"/>
+            <a:endParaRPr b="0" lang="de-DE" sz="3200" spc="-1" strike="noStrike">
+              <a:latin typeface="Arial"/>
+            </a:endParaRPr>
+          </a:p>
+        </p:txBody>
+      </p:sp>
+      <p:sp>
+        <p:nvSpPr>
+          <p:cNvPr id="28" name="PlaceHolder 4"/>
           <p:cNvSpPr>
             <a:spLocks noGrp="1"/>
           </p:cNvSpPr>
@@ -295,18 +279,15 @@
             <a:normAutofit/>
           </a:bodyPr>
           <a:p>
-            <a:endParaRPr b="0" lang="de-DE" sz="1400" spc="-1" strike="noStrike">
-              <a:solidFill>
-                <a:srgbClr val="000000"/>
-              </a:solidFill>
-              <a:latin typeface="Arial"/>
-            </a:endParaRPr>
-          </a:p>
-        </p:txBody>
-      </p:sp>
-      <p:sp>
-        <p:nvSpPr>
-          <p:cNvPr id="31" name="PlaceHolder 5"/>
+            <a:endParaRPr b="0" lang="de-DE" sz="3200" spc="-1" strike="noStrike">
+              <a:latin typeface="Arial"/>
+            </a:endParaRPr>
+          </a:p>
+        </p:txBody>
+      </p:sp>
+      <p:sp>
+        <p:nvSpPr>
+          <p:cNvPr id="29" name="PlaceHolder 5"/>
           <p:cNvSpPr>
             <a:spLocks noGrp="1"/>
           </p:cNvSpPr>
@@ -328,10 +309,7 @@
             <a:normAutofit/>
           </a:bodyPr>
           <a:p>
-            <a:endParaRPr b="0" lang="de-DE" sz="1400" spc="-1" strike="noStrike">
-              <a:solidFill>
-                <a:srgbClr val="000000"/>
-              </a:solidFill>
+            <a:endParaRPr b="0" lang="de-DE" sz="3200" spc="-1" strike="noStrike">
               <a:latin typeface="Arial"/>
             </a:endParaRPr>
           </a:p>
@@ -361,7 +339,7 @@
       </p:grpSpPr>
       <p:sp>
         <p:nvSpPr>
-          <p:cNvPr id="32" name="PlaceHolder 1"/>
+          <p:cNvPr id="30" name="PlaceHolder 1"/>
           <p:cNvSpPr>
             <a:spLocks noGrp="1"/>
           </p:cNvSpPr>
@@ -372,7 +350,7 @@
         <p:spPr>
           <a:xfrm>
             <a:off x="311760" y="744480"/>
-            <a:ext cx="8520120" cy="2052360"/>
+            <a:ext cx="8519760" cy="2052000"/>
           </a:xfrm>
           <a:prstGeom prst="rect">
             <a:avLst/>
@@ -383,18 +361,16 @@
             <a:noAutofit/>
           </a:bodyPr>
           <a:p>
-            <a:endParaRPr b="0" lang="de-DE" sz="1400" spc="-1" strike="noStrike">
-              <a:solidFill>
-                <a:srgbClr val="000000"/>
-              </a:solidFill>
-              <a:latin typeface="Arial"/>
-            </a:endParaRPr>
-          </a:p>
-        </p:txBody>
-      </p:sp>
-      <p:sp>
-        <p:nvSpPr>
-          <p:cNvPr id="33" name="PlaceHolder 2"/>
+            <a:pPr algn="ctr"/>
+            <a:endParaRPr b="0" lang="de-DE" sz="4400" spc="-1" strike="noStrike">
+              <a:latin typeface="Arial"/>
+            </a:endParaRPr>
+          </a:p>
+        </p:txBody>
+      </p:sp>
+      <p:sp>
+        <p:nvSpPr>
+          <p:cNvPr id="31" name="PlaceHolder 2"/>
           <p:cNvSpPr>
             <a:spLocks noGrp="1"/>
           </p:cNvSpPr>
@@ -416,18 +392,15 @@
             <a:normAutofit/>
           </a:bodyPr>
           <a:p>
-            <a:endParaRPr b="0" lang="de-DE" sz="1400" spc="-1" strike="noStrike">
-              <a:solidFill>
-                <a:srgbClr val="000000"/>
-              </a:solidFill>
-              <a:latin typeface="Arial"/>
-            </a:endParaRPr>
-          </a:p>
-        </p:txBody>
-      </p:sp>
-      <p:sp>
-        <p:nvSpPr>
-          <p:cNvPr id="34" name="PlaceHolder 3"/>
+            <a:endParaRPr b="0" lang="de-DE" sz="3200" spc="-1" strike="noStrike">
+              <a:latin typeface="Arial"/>
+            </a:endParaRPr>
+          </a:p>
+        </p:txBody>
+      </p:sp>
+      <p:sp>
+        <p:nvSpPr>
+          <p:cNvPr id="32" name="PlaceHolder 3"/>
           <p:cNvSpPr>
             <a:spLocks noGrp="1"/>
           </p:cNvSpPr>
@@ -449,18 +422,15 @@
             <a:normAutofit/>
           </a:bodyPr>
           <a:p>
-            <a:endParaRPr b="0" lang="de-DE" sz="1400" spc="-1" strike="noStrike">
-              <a:solidFill>
-                <a:srgbClr val="000000"/>
-              </a:solidFill>
-              <a:latin typeface="Arial"/>
-            </a:endParaRPr>
-          </a:p>
-        </p:txBody>
-      </p:sp>
-      <p:sp>
-        <p:nvSpPr>
-          <p:cNvPr id="35" name="PlaceHolder 4"/>
+            <a:endParaRPr b="0" lang="de-DE" sz="3200" spc="-1" strike="noStrike">
+              <a:latin typeface="Arial"/>
+            </a:endParaRPr>
+          </a:p>
+        </p:txBody>
+      </p:sp>
+      <p:sp>
+        <p:nvSpPr>
+          <p:cNvPr id="33" name="PlaceHolder 4"/>
           <p:cNvSpPr>
             <a:spLocks noGrp="1"/>
           </p:cNvSpPr>
@@ -482,18 +452,15 @@
             <a:normAutofit/>
           </a:bodyPr>
           <a:p>
-            <a:endParaRPr b="0" lang="de-DE" sz="1400" spc="-1" strike="noStrike">
-              <a:solidFill>
-                <a:srgbClr val="000000"/>
-              </a:solidFill>
-              <a:latin typeface="Arial"/>
-            </a:endParaRPr>
-          </a:p>
-        </p:txBody>
-      </p:sp>
-      <p:sp>
-        <p:nvSpPr>
-          <p:cNvPr id="36" name="PlaceHolder 5"/>
+            <a:endParaRPr b="0" lang="de-DE" sz="3200" spc="-1" strike="noStrike">
+              <a:latin typeface="Arial"/>
+            </a:endParaRPr>
+          </a:p>
+        </p:txBody>
+      </p:sp>
+      <p:sp>
+        <p:nvSpPr>
+          <p:cNvPr id="34" name="PlaceHolder 5"/>
           <p:cNvSpPr>
             <a:spLocks noGrp="1"/>
           </p:cNvSpPr>
@@ -515,18 +482,15 @@
             <a:normAutofit/>
           </a:bodyPr>
           <a:p>
-            <a:endParaRPr b="0" lang="de-DE" sz="1400" spc="-1" strike="noStrike">
-              <a:solidFill>
-                <a:srgbClr val="000000"/>
-              </a:solidFill>
-              <a:latin typeface="Arial"/>
-            </a:endParaRPr>
-          </a:p>
-        </p:txBody>
-      </p:sp>
-      <p:sp>
-        <p:nvSpPr>
-          <p:cNvPr id="37" name="PlaceHolder 6"/>
+            <a:endParaRPr b="0" lang="de-DE" sz="3200" spc="-1" strike="noStrike">
+              <a:latin typeface="Arial"/>
+            </a:endParaRPr>
+          </a:p>
+        </p:txBody>
+      </p:sp>
+      <p:sp>
+        <p:nvSpPr>
+          <p:cNvPr id="35" name="PlaceHolder 6"/>
           <p:cNvSpPr>
             <a:spLocks noGrp="1"/>
           </p:cNvSpPr>
@@ -548,18 +512,15 @@
             <a:normAutofit/>
           </a:bodyPr>
           <a:p>
-            <a:endParaRPr b="0" lang="de-DE" sz="1400" spc="-1" strike="noStrike">
-              <a:solidFill>
-                <a:srgbClr val="000000"/>
-              </a:solidFill>
-              <a:latin typeface="Arial"/>
-            </a:endParaRPr>
-          </a:p>
-        </p:txBody>
-      </p:sp>
-      <p:sp>
-        <p:nvSpPr>
-          <p:cNvPr id="38" name="PlaceHolder 7"/>
+            <a:endParaRPr b="0" lang="de-DE" sz="3200" spc="-1" strike="noStrike">
+              <a:latin typeface="Arial"/>
+            </a:endParaRPr>
+          </a:p>
+        </p:txBody>
+      </p:sp>
+      <p:sp>
+        <p:nvSpPr>
+          <p:cNvPr id="36" name="PlaceHolder 7"/>
           <p:cNvSpPr>
             <a:spLocks noGrp="1"/>
           </p:cNvSpPr>
@@ -581,10 +542,7 @@
             <a:normAutofit/>
           </a:bodyPr>
           <a:p>
-            <a:endParaRPr b="0" lang="de-DE" sz="1400" spc="-1" strike="noStrike">
-              <a:solidFill>
-                <a:srgbClr val="000000"/>
-              </a:solidFill>
+            <a:endParaRPr b="0" lang="de-DE" sz="3200" spc="-1" strike="noStrike">
               <a:latin typeface="Arial"/>
             </a:endParaRPr>
           </a:p>
@@ -614,7 +572,7 @@
       </p:grpSpPr>
       <p:sp>
         <p:nvSpPr>
-          <p:cNvPr id="3" name="PlaceHolder 1"/>
+          <p:cNvPr id="1" name="PlaceHolder 1"/>
           <p:cNvSpPr>
             <a:spLocks noGrp="1"/>
           </p:cNvSpPr>
@@ -625,7 +583,7 @@
         <p:spPr>
           <a:xfrm>
             <a:off x="311760" y="744480"/>
-            <a:ext cx="8520120" cy="2052360"/>
+            <a:ext cx="8519760" cy="2052000"/>
           </a:xfrm>
           <a:prstGeom prst="rect">
             <a:avLst/>
@@ -636,18 +594,16 @@
             <a:noAutofit/>
           </a:bodyPr>
           <a:p>
-            <a:endParaRPr b="0" lang="de-DE" sz="1400" spc="-1" strike="noStrike">
-              <a:solidFill>
-                <a:srgbClr val="000000"/>
-              </a:solidFill>
-              <a:latin typeface="Arial"/>
-            </a:endParaRPr>
-          </a:p>
-        </p:txBody>
-      </p:sp>
-      <p:sp>
-        <p:nvSpPr>
-          <p:cNvPr id="4" name="PlaceHolder 2"/>
+            <a:pPr algn="ctr"/>
+            <a:endParaRPr b="0" lang="de-DE" sz="4400" spc="-1" strike="noStrike">
+              <a:latin typeface="Arial"/>
+            </a:endParaRPr>
+          </a:p>
+        </p:txBody>
+      </p:sp>
+      <p:sp>
+        <p:nvSpPr>
+          <p:cNvPr id="2" name="PlaceHolder 2"/>
           <p:cNvSpPr>
             <a:spLocks noGrp="1"/>
           </p:cNvSpPr>
@@ -700,7 +656,7 @@
       </p:grpSpPr>
       <p:sp>
         <p:nvSpPr>
-          <p:cNvPr id="5" name="PlaceHolder 1"/>
+          <p:cNvPr id="3" name="PlaceHolder 1"/>
           <p:cNvSpPr>
             <a:spLocks noGrp="1"/>
           </p:cNvSpPr>
@@ -711,7 +667,7 @@
         <p:spPr>
           <a:xfrm>
             <a:off x="311760" y="744480"/>
-            <a:ext cx="8520120" cy="2052360"/>
+            <a:ext cx="8519760" cy="2052000"/>
           </a:xfrm>
           <a:prstGeom prst="rect">
             <a:avLst/>
@@ -722,18 +678,16 @@
             <a:noAutofit/>
           </a:bodyPr>
           <a:p>
-            <a:endParaRPr b="0" lang="de-DE" sz="1400" spc="-1" strike="noStrike">
-              <a:solidFill>
-                <a:srgbClr val="000000"/>
-              </a:solidFill>
-              <a:latin typeface="Arial"/>
-            </a:endParaRPr>
-          </a:p>
-        </p:txBody>
-      </p:sp>
-      <p:sp>
-        <p:nvSpPr>
-          <p:cNvPr id="6" name="PlaceHolder 2"/>
+            <a:pPr algn="ctr"/>
+            <a:endParaRPr b="0" lang="de-DE" sz="4400" spc="-1" strike="noStrike">
+              <a:latin typeface="Arial"/>
+            </a:endParaRPr>
+          </a:p>
+        </p:txBody>
+      </p:sp>
+      <p:sp>
+        <p:nvSpPr>
+          <p:cNvPr id="4" name="PlaceHolder 2"/>
           <p:cNvSpPr>
             <a:spLocks noGrp="1"/>
           </p:cNvSpPr>
@@ -755,10 +709,7 @@
             <a:normAutofit/>
           </a:bodyPr>
           <a:p>
-            <a:endParaRPr b="0" lang="de-DE" sz="1400" spc="-1" strike="noStrike">
-              <a:solidFill>
-                <a:srgbClr val="000000"/>
-              </a:solidFill>
+            <a:endParaRPr b="0" lang="de-DE" sz="3200" spc="-1" strike="noStrike">
               <a:latin typeface="Arial"/>
             </a:endParaRPr>
           </a:p>
@@ -788,7 +739,7 @@
       </p:grpSpPr>
       <p:sp>
         <p:nvSpPr>
-          <p:cNvPr id="7" name="PlaceHolder 1"/>
+          <p:cNvPr id="5" name="PlaceHolder 1"/>
           <p:cNvSpPr>
             <a:spLocks noGrp="1"/>
           </p:cNvSpPr>
@@ -799,7 +750,7 @@
         <p:spPr>
           <a:xfrm>
             <a:off x="311760" y="744480"/>
-            <a:ext cx="8520120" cy="2052360"/>
+            <a:ext cx="8519760" cy="2052000"/>
           </a:xfrm>
           <a:prstGeom prst="rect">
             <a:avLst/>
@@ -810,18 +761,16 @@
             <a:noAutofit/>
           </a:bodyPr>
           <a:p>
-            <a:endParaRPr b="0" lang="de-DE" sz="1400" spc="-1" strike="noStrike">
-              <a:solidFill>
-                <a:srgbClr val="000000"/>
-              </a:solidFill>
-              <a:latin typeface="Arial"/>
-            </a:endParaRPr>
-          </a:p>
-        </p:txBody>
-      </p:sp>
-      <p:sp>
-        <p:nvSpPr>
-          <p:cNvPr id="8" name="PlaceHolder 2"/>
+            <a:pPr algn="ctr"/>
+            <a:endParaRPr b="0" lang="de-DE" sz="4400" spc="-1" strike="noStrike">
+              <a:latin typeface="Arial"/>
+            </a:endParaRPr>
+          </a:p>
+        </p:txBody>
+      </p:sp>
+      <p:sp>
+        <p:nvSpPr>
+          <p:cNvPr id="6" name="PlaceHolder 2"/>
           <p:cNvSpPr>
             <a:spLocks noGrp="1"/>
           </p:cNvSpPr>
@@ -843,18 +792,15 @@
             <a:normAutofit/>
           </a:bodyPr>
           <a:p>
-            <a:endParaRPr b="0" lang="de-DE" sz="1400" spc="-1" strike="noStrike">
-              <a:solidFill>
-                <a:srgbClr val="000000"/>
-              </a:solidFill>
-              <a:latin typeface="Arial"/>
-            </a:endParaRPr>
-          </a:p>
-        </p:txBody>
-      </p:sp>
-      <p:sp>
-        <p:nvSpPr>
-          <p:cNvPr id="9" name="PlaceHolder 3"/>
+            <a:endParaRPr b="0" lang="de-DE" sz="3200" spc="-1" strike="noStrike">
+              <a:latin typeface="Arial"/>
+            </a:endParaRPr>
+          </a:p>
+        </p:txBody>
+      </p:sp>
+      <p:sp>
+        <p:nvSpPr>
+          <p:cNvPr id="7" name="PlaceHolder 3"/>
           <p:cNvSpPr>
             <a:spLocks noGrp="1"/>
           </p:cNvSpPr>
@@ -876,10 +822,7 @@
             <a:normAutofit/>
           </a:bodyPr>
           <a:p>
-            <a:endParaRPr b="0" lang="de-DE" sz="1400" spc="-1" strike="noStrike">
-              <a:solidFill>
-                <a:srgbClr val="000000"/>
-              </a:solidFill>
+            <a:endParaRPr b="0" lang="de-DE" sz="3200" spc="-1" strike="noStrike">
               <a:latin typeface="Arial"/>
             </a:endParaRPr>
           </a:p>
@@ -909,7 +852,7 @@
       </p:grpSpPr>
       <p:sp>
         <p:nvSpPr>
-          <p:cNvPr id="10" name="PlaceHolder 1"/>
+          <p:cNvPr id="8" name="PlaceHolder 1"/>
           <p:cNvSpPr>
             <a:spLocks noGrp="1"/>
           </p:cNvSpPr>
@@ -920,7 +863,7 @@
         <p:spPr>
           <a:xfrm>
             <a:off x="311760" y="744480"/>
-            <a:ext cx="8520120" cy="2052360"/>
+            <a:ext cx="8519760" cy="2052000"/>
           </a:xfrm>
           <a:prstGeom prst="rect">
             <a:avLst/>
@@ -931,10 +874,8 @@
             <a:noAutofit/>
           </a:bodyPr>
           <a:p>
-            <a:endParaRPr b="0" lang="de-DE" sz="1400" spc="-1" strike="noStrike">
-              <a:solidFill>
-                <a:srgbClr val="000000"/>
-              </a:solidFill>
+            <a:pPr algn="ctr"/>
+            <a:endParaRPr b="0" lang="de-DE" sz="4400" spc="-1" strike="noStrike">
               <a:latin typeface="Arial"/>
             </a:endParaRPr>
           </a:p>
@@ -964,7 +905,7 @@
       </p:grpSpPr>
       <p:sp>
         <p:nvSpPr>
-          <p:cNvPr id="11" name="PlaceHolder 1"/>
+          <p:cNvPr id="9" name="PlaceHolder 1"/>
           <p:cNvSpPr>
             <a:spLocks noGrp="1"/>
           </p:cNvSpPr>
@@ -975,7 +916,7 @@
         <p:spPr>
           <a:xfrm>
             <a:off x="311760" y="744480"/>
-            <a:ext cx="8520120" cy="9514800"/>
+            <a:ext cx="8519760" cy="9513000"/>
           </a:xfrm>
           <a:prstGeom prst="rect">
             <a:avLst/>
@@ -1017,7 +958,7 @@
       </p:grpSpPr>
       <p:sp>
         <p:nvSpPr>
-          <p:cNvPr id="12" name="PlaceHolder 1"/>
+          <p:cNvPr id="10" name="PlaceHolder 1"/>
           <p:cNvSpPr>
             <a:spLocks noGrp="1"/>
           </p:cNvSpPr>
@@ -1028,7 +969,7 @@
         <p:spPr>
           <a:xfrm>
             <a:off x="311760" y="744480"/>
-            <a:ext cx="8520120" cy="2052360"/>
+            <a:ext cx="8519760" cy="2052000"/>
           </a:xfrm>
           <a:prstGeom prst="rect">
             <a:avLst/>
@@ -1039,18 +980,16 @@
             <a:noAutofit/>
           </a:bodyPr>
           <a:p>
-            <a:endParaRPr b="0" lang="de-DE" sz="1400" spc="-1" strike="noStrike">
-              <a:solidFill>
-                <a:srgbClr val="000000"/>
-              </a:solidFill>
-              <a:latin typeface="Arial"/>
-            </a:endParaRPr>
-          </a:p>
-        </p:txBody>
-      </p:sp>
-      <p:sp>
-        <p:nvSpPr>
-          <p:cNvPr id="13" name="PlaceHolder 2"/>
+            <a:pPr algn="ctr"/>
+            <a:endParaRPr b="0" lang="de-DE" sz="4400" spc="-1" strike="noStrike">
+              <a:latin typeface="Arial"/>
+            </a:endParaRPr>
+          </a:p>
+        </p:txBody>
+      </p:sp>
+      <p:sp>
+        <p:nvSpPr>
+          <p:cNvPr id="11" name="PlaceHolder 2"/>
           <p:cNvSpPr>
             <a:spLocks noGrp="1"/>
           </p:cNvSpPr>
@@ -1072,18 +1011,15 @@
             <a:normAutofit/>
           </a:bodyPr>
           <a:p>
-            <a:endParaRPr b="0" lang="de-DE" sz="1400" spc="-1" strike="noStrike">
-              <a:solidFill>
-                <a:srgbClr val="000000"/>
-              </a:solidFill>
-              <a:latin typeface="Arial"/>
-            </a:endParaRPr>
-          </a:p>
-        </p:txBody>
-      </p:sp>
-      <p:sp>
-        <p:nvSpPr>
-          <p:cNvPr id="14" name="PlaceHolder 3"/>
+            <a:endParaRPr b="0" lang="de-DE" sz="3200" spc="-1" strike="noStrike">
+              <a:latin typeface="Arial"/>
+            </a:endParaRPr>
+          </a:p>
+        </p:txBody>
+      </p:sp>
+      <p:sp>
+        <p:nvSpPr>
+          <p:cNvPr id="12" name="PlaceHolder 3"/>
           <p:cNvSpPr>
             <a:spLocks noGrp="1"/>
           </p:cNvSpPr>
@@ -1105,18 +1041,15 @@
             <a:normAutofit/>
           </a:bodyPr>
           <a:p>
-            <a:endParaRPr b="0" lang="de-DE" sz="1400" spc="-1" strike="noStrike">
-              <a:solidFill>
-                <a:srgbClr val="000000"/>
-              </a:solidFill>
-              <a:latin typeface="Arial"/>
-            </a:endParaRPr>
-          </a:p>
-        </p:txBody>
-      </p:sp>
-      <p:sp>
-        <p:nvSpPr>
-          <p:cNvPr id="15" name="PlaceHolder 4"/>
+            <a:endParaRPr b="0" lang="de-DE" sz="3200" spc="-1" strike="noStrike">
+              <a:latin typeface="Arial"/>
+            </a:endParaRPr>
+          </a:p>
+        </p:txBody>
+      </p:sp>
+      <p:sp>
+        <p:nvSpPr>
+          <p:cNvPr id="13" name="PlaceHolder 4"/>
           <p:cNvSpPr>
             <a:spLocks noGrp="1"/>
           </p:cNvSpPr>
@@ -1138,10 +1071,7 @@
             <a:normAutofit/>
           </a:bodyPr>
           <a:p>
-            <a:endParaRPr b="0" lang="de-DE" sz="1400" spc="-1" strike="noStrike">
-              <a:solidFill>
-                <a:srgbClr val="000000"/>
-              </a:solidFill>
+            <a:endParaRPr b="0" lang="de-DE" sz="3200" spc="-1" strike="noStrike">
               <a:latin typeface="Arial"/>
             </a:endParaRPr>
           </a:p>
@@ -1171,7 +1101,7 @@
       </p:grpSpPr>
       <p:sp>
         <p:nvSpPr>
-          <p:cNvPr id="16" name="PlaceHolder 1"/>
+          <p:cNvPr id="14" name="PlaceHolder 1"/>
           <p:cNvSpPr>
             <a:spLocks noGrp="1"/>
           </p:cNvSpPr>
@@ -1182,7 +1112,7 @@
         <p:spPr>
           <a:xfrm>
             <a:off x="311760" y="744480"/>
-            <a:ext cx="8520120" cy="2052360"/>
+            <a:ext cx="8519760" cy="2052000"/>
           </a:xfrm>
           <a:prstGeom prst="rect">
             <a:avLst/>
@@ -1193,18 +1123,16 @@
             <a:noAutofit/>
           </a:bodyPr>
           <a:p>
-            <a:endParaRPr b="0" lang="de-DE" sz="1400" spc="-1" strike="noStrike">
-              <a:solidFill>
-                <a:srgbClr val="000000"/>
-              </a:solidFill>
-              <a:latin typeface="Arial"/>
-            </a:endParaRPr>
-          </a:p>
-        </p:txBody>
-      </p:sp>
-      <p:sp>
-        <p:nvSpPr>
-          <p:cNvPr id="17" name="PlaceHolder 2"/>
+            <a:pPr algn="ctr"/>
+            <a:endParaRPr b="0" lang="de-DE" sz="4400" spc="-1" strike="noStrike">
+              <a:latin typeface="Arial"/>
+            </a:endParaRPr>
+          </a:p>
+        </p:txBody>
+      </p:sp>
+      <p:sp>
+        <p:nvSpPr>
+          <p:cNvPr id="15" name="PlaceHolder 2"/>
           <p:cNvSpPr>
             <a:spLocks noGrp="1"/>
           </p:cNvSpPr>
@@ -1226,18 +1154,15 @@
             <a:normAutofit/>
           </a:bodyPr>
           <a:p>
-            <a:endParaRPr b="0" lang="de-DE" sz="1400" spc="-1" strike="noStrike">
-              <a:solidFill>
-                <a:srgbClr val="000000"/>
-              </a:solidFill>
-              <a:latin typeface="Arial"/>
-            </a:endParaRPr>
-          </a:p>
-        </p:txBody>
-      </p:sp>
-      <p:sp>
-        <p:nvSpPr>
-          <p:cNvPr id="18" name="PlaceHolder 3"/>
+            <a:endParaRPr b="0" lang="de-DE" sz="3200" spc="-1" strike="noStrike">
+              <a:latin typeface="Arial"/>
+            </a:endParaRPr>
+          </a:p>
+        </p:txBody>
+      </p:sp>
+      <p:sp>
+        <p:nvSpPr>
+          <p:cNvPr id="16" name="PlaceHolder 3"/>
           <p:cNvSpPr>
             <a:spLocks noGrp="1"/>
           </p:cNvSpPr>
@@ -1259,18 +1184,15 @@
             <a:normAutofit/>
           </a:bodyPr>
           <a:p>
-            <a:endParaRPr b="0" lang="de-DE" sz="1400" spc="-1" strike="noStrike">
-              <a:solidFill>
-                <a:srgbClr val="000000"/>
-              </a:solidFill>
-              <a:latin typeface="Arial"/>
-            </a:endParaRPr>
-          </a:p>
-        </p:txBody>
-      </p:sp>
-      <p:sp>
-        <p:nvSpPr>
-          <p:cNvPr id="19" name="PlaceHolder 4"/>
+            <a:endParaRPr b="0" lang="de-DE" sz="3200" spc="-1" strike="noStrike">
+              <a:latin typeface="Arial"/>
+            </a:endParaRPr>
+          </a:p>
+        </p:txBody>
+      </p:sp>
+      <p:sp>
+        <p:nvSpPr>
+          <p:cNvPr id="17" name="PlaceHolder 4"/>
           <p:cNvSpPr>
             <a:spLocks noGrp="1"/>
           </p:cNvSpPr>
@@ -1292,10 +1214,7 @@
             <a:normAutofit/>
           </a:bodyPr>
           <a:p>
-            <a:endParaRPr b="0" lang="de-DE" sz="1400" spc="-1" strike="noStrike">
-              <a:solidFill>
-                <a:srgbClr val="000000"/>
-              </a:solidFill>
+            <a:endParaRPr b="0" lang="de-DE" sz="3200" spc="-1" strike="noStrike">
               <a:latin typeface="Arial"/>
             </a:endParaRPr>
           </a:p>
@@ -1325,7 +1244,7 @@
       </p:grpSpPr>
       <p:sp>
         <p:nvSpPr>
-          <p:cNvPr id="20" name="PlaceHolder 1"/>
+          <p:cNvPr id="18" name="PlaceHolder 1"/>
           <p:cNvSpPr>
             <a:spLocks noGrp="1"/>
           </p:cNvSpPr>
@@ -1336,7 +1255,7 @@
         <p:spPr>
           <a:xfrm>
             <a:off x="311760" y="744480"/>
-            <a:ext cx="8520120" cy="2052360"/>
+            <a:ext cx="8519760" cy="2052000"/>
           </a:xfrm>
           <a:prstGeom prst="rect">
             <a:avLst/>
@@ -1347,18 +1266,16 @@
             <a:noAutofit/>
           </a:bodyPr>
           <a:p>
-            <a:endParaRPr b="0" lang="de-DE" sz="1400" spc="-1" strike="noStrike">
-              <a:solidFill>
-                <a:srgbClr val="000000"/>
-              </a:solidFill>
-              <a:latin typeface="Arial"/>
-            </a:endParaRPr>
-          </a:p>
-        </p:txBody>
-      </p:sp>
-      <p:sp>
-        <p:nvSpPr>
-          <p:cNvPr id="21" name="PlaceHolder 2"/>
+            <a:pPr algn="ctr"/>
+            <a:endParaRPr b="0" lang="de-DE" sz="4400" spc="-1" strike="noStrike">
+              <a:latin typeface="Arial"/>
+            </a:endParaRPr>
+          </a:p>
+        </p:txBody>
+      </p:sp>
+      <p:sp>
+        <p:nvSpPr>
+          <p:cNvPr id="19" name="PlaceHolder 2"/>
           <p:cNvSpPr>
             <a:spLocks noGrp="1"/>
           </p:cNvSpPr>
@@ -1380,18 +1297,15 @@
             <a:normAutofit/>
           </a:bodyPr>
           <a:p>
-            <a:endParaRPr b="0" lang="de-DE" sz="1400" spc="-1" strike="noStrike">
-              <a:solidFill>
-                <a:srgbClr val="000000"/>
-              </a:solidFill>
-              <a:latin typeface="Arial"/>
-            </a:endParaRPr>
-          </a:p>
-        </p:txBody>
-      </p:sp>
-      <p:sp>
-        <p:nvSpPr>
-          <p:cNvPr id="22" name="PlaceHolder 3"/>
+            <a:endParaRPr b="0" lang="de-DE" sz="3200" spc="-1" strike="noStrike">
+              <a:latin typeface="Arial"/>
+            </a:endParaRPr>
+          </a:p>
+        </p:txBody>
+      </p:sp>
+      <p:sp>
+        <p:nvSpPr>
+          <p:cNvPr id="20" name="PlaceHolder 3"/>
           <p:cNvSpPr>
             <a:spLocks noGrp="1"/>
           </p:cNvSpPr>
@@ -1413,18 +1327,15 @@
             <a:normAutofit/>
           </a:bodyPr>
           <a:p>
-            <a:endParaRPr b="0" lang="de-DE" sz="1400" spc="-1" strike="noStrike">
-              <a:solidFill>
-                <a:srgbClr val="000000"/>
-              </a:solidFill>
-              <a:latin typeface="Arial"/>
-            </a:endParaRPr>
-          </a:p>
-        </p:txBody>
-      </p:sp>
-      <p:sp>
-        <p:nvSpPr>
-          <p:cNvPr id="23" name="PlaceHolder 4"/>
+            <a:endParaRPr b="0" lang="de-DE" sz="3200" spc="-1" strike="noStrike">
+              <a:latin typeface="Arial"/>
+            </a:endParaRPr>
+          </a:p>
+        </p:txBody>
+      </p:sp>
+      <p:sp>
+        <p:nvSpPr>
+          <p:cNvPr id="21" name="PlaceHolder 4"/>
           <p:cNvSpPr>
             <a:spLocks noGrp="1"/>
           </p:cNvSpPr>
@@ -1446,10 +1357,7 @@
             <a:normAutofit/>
           </a:bodyPr>
           <a:p>
-            <a:endParaRPr b="0" lang="de-DE" sz="1400" spc="-1" strike="noStrike">
-              <a:solidFill>
-                <a:srgbClr val="000000"/>
-              </a:solidFill>
+            <a:endParaRPr b="0" lang="de-DE" sz="3200" spc="-1" strike="noStrike">
               <a:latin typeface="Arial"/>
             </a:endParaRPr>
           </a:p>
@@ -1497,297 +1405,25 @@
         <p:spPr>
           <a:xfrm>
             <a:off x="311760" y="744480"/>
-            <a:ext cx="8520120" cy="2052360"/>
-          </a:xfrm>
-          <a:prstGeom prst="rect">
-            <a:avLst/>
-          </a:prstGeom>
-        </p:spPr>
-        <p:txBody>
-          <a:bodyPr tIns="91440" bIns="91440" anchor="b">
+            <a:ext cx="8519760" cy="2052000"/>
+          </a:xfrm>
+          <a:prstGeom prst="rect">
+            <a:avLst/>
+          </a:prstGeom>
+        </p:spPr>
+        <p:txBody>
+          <a:bodyPr lIns="0" rIns="0" tIns="0" bIns="0" anchor="ctr">
             <a:noAutofit/>
           </a:bodyPr>
           <a:p>
             <a:pPr algn="ctr"/>
             <a:r>
-              <a:rPr b="0" lang="de-DE" sz="5200" spc="-1" strike="noStrike">
-                <a:solidFill>
-                  <a:srgbClr val="000000"/>
-                </a:solidFill>
+              <a:rPr b="0" lang="de-DE" sz="1800" spc="-1" strike="noStrike">
                 <a:latin typeface="Arial"/>
               </a:rPr>
               <a:t>Click to edit the title text format</a:t>
             </a:r>
-            <a:endParaRPr b="0" lang="de-DE" sz="5200" spc="-1" strike="noStrike">
-              <a:solidFill>
-                <a:srgbClr val="000000"/>
-              </a:solidFill>
-              <a:latin typeface="Arial"/>
-            </a:endParaRPr>
-          </a:p>
-        </p:txBody>
-      </p:sp>
-      <p:sp>
-        <p:nvSpPr>
-          <p:cNvPr id="1" name="PlaceHolder 2"/>
-          <p:cNvSpPr>
-            <a:spLocks noGrp="1"/>
-          </p:cNvSpPr>
-          <p:nvPr>
-            <p:ph type="sldNum"/>
-          </p:nvPr>
-        </p:nvSpPr>
-        <p:spPr>
-          <a:xfrm>
-            <a:off x="8472600" y="4663080"/>
-            <a:ext cx="548280" cy="393120"/>
-          </a:xfrm>
-          <a:prstGeom prst="rect">
-            <a:avLst/>
-          </a:prstGeom>
-        </p:spPr>
-        <p:txBody>
-          <a:bodyPr tIns="91440" bIns="91440" anchor="ctr">
-            <a:noAutofit/>
-          </a:bodyPr>
-          <a:p>
-            <a:pPr algn="r">
-              <a:lnSpc>
-                <a:spcPct val="100000"/>
-              </a:lnSpc>
-            </a:pPr>
-            <a:fld id="{2334D49A-4571-4CE3-B4CC-4D573DEC632F}" type="slidenum">
-              <a:rPr b="0" lang="en" sz="1000" spc="-1" strike="noStrike">
-                <a:solidFill>
-                  <a:srgbClr val="595959"/>
-                </a:solidFill>
-                <a:latin typeface="Arial"/>
-                <a:ea typeface="Arial"/>
-              </a:rPr>
-              <a:t>&lt;number&gt;</a:t>
-            </a:fld>
-            <a:endParaRPr b="0" lang="de-DE" sz="1000" spc="-1" strike="noStrike">
-              <a:latin typeface="Times New Roman"/>
-            </a:endParaRPr>
-          </a:p>
-        </p:txBody>
-      </p:sp>
-      <p:sp>
-        <p:nvSpPr>
-          <p:cNvPr id="2" name="PlaceHolder 3"/>
-          <p:cNvSpPr>
-            <a:spLocks noGrp="1"/>
-          </p:cNvSpPr>
-          <p:nvPr>
-            <p:ph type="body"/>
-          </p:nvPr>
-        </p:nvSpPr>
-        <p:spPr>
-          <a:xfrm>
-            <a:off x="457200" y="1203480"/>
-            <a:ext cx="8229240" cy="2982960"/>
-          </a:xfrm>
-          <a:prstGeom prst="rect">
-            <a:avLst/>
-          </a:prstGeom>
-        </p:spPr>
-        <p:txBody>
-          <a:bodyPr lIns="0" rIns="0" tIns="0" bIns="0">
-            <a:normAutofit/>
-          </a:bodyPr>
-          <a:p>
-            <a:pPr marL="432000" indent="-324000">
-              <a:spcBef>
-                <a:spcPts val="1417"/>
-              </a:spcBef>
-              <a:buClr>
-                <a:srgbClr val="000000"/>
-              </a:buClr>
-              <a:buSzPct val="45000"/>
-              <a:buFont typeface="Wingdings" charset="2"/>
-              <a:buChar char=""/>
-            </a:pPr>
-            <a:r>
-              <a:rPr b="0" lang="de-DE" sz="1400" spc="-1" strike="noStrike">
-                <a:solidFill>
-                  <a:srgbClr val="000000"/>
-                </a:solidFill>
-                <a:latin typeface="Arial"/>
-              </a:rPr>
-              <a:t>Click to edit the outline text format</a:t>
-            </a:r>
-            <a:endParaRPr b="0" lang="de-DE" sz="1400" spc="-1" strike="noStrike">
-              <a:solidFill>
-                <a:srgbClr val="000000"/>
-              </a:solidFill>
-              <a:latin typeface="Arial"/>
-            </a:endParaRPr>
-          </a:p>
-          <a:p>
-            <a:pPr lvl="1" marL="864000" indent="-324000">
-              <a:spcBef>
-                <a:spcPts val="1134"/>
-              </a:spcBef>
-              <a:buClr>
-                <a:srgbClr val="000000"/>
-              </a:buClr>
-              <a:buSzPct val="75000"/>
-              <a:buFont typeface="Symbol" charset="2"/>
-              <a:buChar char=""/>
-            </a:pPr>
-            <a:r>
-              <a:rPr b="0" lang="de-DE" sz="1400" spc="-1" strike="noStrike">
-                <a:solidFill>
-                  <a:srgbClr val="000000"/>
-                </a:solidFill>
-                <a:latin typeface="Arial"/>
-              </a:rPr>
-              <a:t>Second Outline Level</a:t>
-            </a:r>
-            <a:endParaRPr b="0" lang="de-DE" sz="1400" spc="-1" strike="noStrike">
-              <a:solidFill>
-                <a:srgbClr val="000000"/>
-              </a:solidFill>
-              <a:latin typeface="Arial"/>
-            </a:endParaRPr>
-          </a:p>
-          <a:p>
-            <a:pPr lvl="2" marL="1296000" indent="-288000">
-              <a:spcBef>
-                <a:spcPts val="850"/>
-              </a:spcBef>
-              <a:buClr>
-                <a:srgbClr val="000000"/>
-              </a:buClr>
-              <a:buSzPct val="45000"/>
-              <a:buFont typeface="Wingdings" charset="2"/>
-              <a:buChar char=""/>
-            </a:pPr>
-            <a:r>
-              <a:rPr b="0" lang="de-DE" sz="1400" spc="-1" strike="noStrike">
-                <a:solidFill>
-                  <a:srgbClr val="000000"/>
-                </a:solidFill>
-                <a:latin typeface="Arial"/>
-              </a:rPr>
-              <a:t>Third Outline Level</a:t>
-            </a:r>
-            <a:endParaRPr b="0" lang="de-DE" sz="1400" spc="-1" strike="noStrike">
-              <a:solidFill>
-                <a:srgbClr val="000000"/>
-              </a:solidFill>
-              <a:latin typeface="Arial"/>
-            </a:endParaRPr>
-          </a:p>
-          <a:p>
-            <a:pPr lvl="3" marL="1728000" indent="-216000">
-              <a:spcBef>
-                <a:spcPts val="567"/>
-              </a:spcBef>
-              <a:buClr>
-                <a:srgbClr val="000000"/>
-              </a:buClr>
-              <a:buSzPct val="75000"/>
-              <a:buFont typeface="Symbol" charset="2"/>
-              <a:buChar char=""/>
-            </a:pPr>
-            <a:r>
-              <a:rPr b="0" lang="de-DE" sz="1400" spc="-1" strike="noStrike">
-                <a:solidFill>
-                  <a:srgbClr val="000000"/>
-                </a:solidFill>
-                <a:latin typeface="Arial"/>
-              </a:rPr>
-              <a:t>Fourth Outline Level</a:t>
-            </a:r>
-            <a:endParaRPr b="0" lang="de-DE" sz="1400" spc="-1" strike="noStrike">
-              <a:solidFill>
-                <a:srgbClr val="000000"/>
-              </a:solidFill>
-              <a:latin typeface="Arial"/>
-            </a:endParaRPr>
-          </a:p>
-          <a:p>
-            <a:pPr lvl="4" marL="2160000" indent="-216000">
-              <a:spcBef>
-                <a:spcPts val="283"/>
-              </a:spcBef>
-              <a:buClr>
-                <a:srgbClr val="000000"/>
-              </a:buClr>
-              <a:buSzPct val="45000"/>
-              <a:buFont typeface="Wingdings" charset="2"/>
-              <a:buChar char=""/>
-            </a:pPr>
-            <a:r>
-              <a:rPr b="0" lang="de-DE" sz="2000" spc="-1" strike="noStrike">
-                <a:solidFill>
-                  <a:srgbClr val="000000"/>
-                </a:solidFill>
-                <a:latin typeface="Arial"/>
-              </a:rPr>
-              <a:t>Fifth Outline Level</a:t>
-            </a:r>
-            <a:endParaRPr b="0" lang="de-DE" sz="2000" spc="-1" strike="noStrike">
-              <a:solidFill>
-                <a:srgbClr val="000000"/>
-              </a:solidFill>
-              <a:latin typeface="Arial"/>
-            </a:endParaRPr>
-          </a:p>
-          <a:p>
-            <a:pPr lvl="5" marL="2592000" indent="-216000">
-              <a:spcBef>
-                <a:spcPts val="283"/>
-              </a:spcBef>
-              <a:buClr>
-                <a:srgbClr val="000000"/>
-              </a:buClr>
-              <a:buSzPct val="45000"/>
-              <a:buFont typeface="Wingdings" charset="2"/>
-              <a:buChar char=""/>
-            </a:pPr>
-            <a:r>
-              <a:rPr b="0" lang="de-DE" sz="2000" spc="-1" strike="noStrike">
-                <a:solidFill>
-                  <a:srgbClr val="000000"/>
-                </a:solidFill>
-                <a:latin typeface="Arial"/>
-              </a:rPr>
-              <a:t>Sixth Outline Level</a:t>
-            </a:r>
-            <a:endParaRPr b="0" lang="de-DE" sz="2000" spc="-1" strike="noStrike">
-              <a:solidFill>
-                <a:srgbClr val="000000"/>
-              </a:solidFill>
-              <a:latin typeface="Arial"/>
-            </a:endParaRPr>
-          </a:p>
-          <a:p>
-            <a:pPr lvl="6" marL="3024000" indent="-216000">
-              <a:spcBef>
-                <a:spcPts val="283"/>
-              </a:spcBef>
-              <a:buClr>
-                <a:srgbClr val="000000"/>
-              </a:buClr>
-              <a:buSzPct val="45000"/>
-              <a:buFont typeface="Wingdings" charset="2"/>
-              <a:buChar char=""/>
-            </a:pPr>
-            <a:r>
-              <a:rPr b="0" lang="de-DE" sz="2000" spc="-1" strike="noStrike">
-                <a:solidFill>
-                  <a:srgbClr val="000000"/>
-                </a:solidFill>
-                <a:latin typeface="Arial"/>
-              </a:rPr>
-              <a:t>Seventh Outline Level</a:t>
-            </a:r>
-            <a:endParaRPr b="0" lang="de-DE" sz="2000" spc="-1" strike="noStrike">
-              <a:solidFill>
-                <a:srgbClr val="000000"/>
-              </a:solidFill>
+            <a:endParaRPr b="0" lang="de-DE" sz="1800" spc="-1" strike="noStrike">
               <a:latin typeface="Arial"/>
             </a:endParaRPr>
           </a:p>
@@ -1832,14 +1468,14 @@
       </p:grpSpPr>
       <p:sp>
         <p:nvSpPr>
-          <p:cNvPr id="39" name="CustomShape 1"/>
+          <p:cNvPr id="37" name="CustomShape 1"/>
           <p:cNvSpPr/>
           <p:nvPr/>
         </p:nvSpPr>
         <p:spPr>
           <a:xfrm>
             <a:off x="1774800" y="398880"/>
-            <a:ext cx="1307520" cy="597240"/>
+            <a:ext cx="1307160" cy="596880"/>
           </a:xfrm>
           <a:prstGeom prst="rect">
             <a:avLst/>
@@ -1858,7 +1494,7 @@
           <a:fontRef idx="minor"/>
         </p:style>
         <p:txBody>
-          <a:bodyPr tIns="91440" bIns="91440" anchor="ctr">
+          <a:bodyPr lIns="90000" rIns="90000" tIns="91440" bIns="91440" anchor="ctr">
             <a:noAutofit/>
           </a:bodyPr>
           <a:p>
@@ -1885,14 +1521,14 @@
       </p:sp>
       <p:sp>
         <p:nvSpPr>
-          <p:cNvPr id="40" name="CustomShape 2"/>
+          <p:cNvPr id="38" name="CustomShape 2"/>
           <p:cNvSpPr/>
           <p:nvPr/>
         </p:nvSpPr>
         <p:spPr>
           <a:xfrm>
             <a:off x="7405920" y="360000"/>
-            <a:ext cx="1666080" cy="597240"/>
+            <a:ext cx="1665720" cy="596880"/>
           </a:xfrm>
           <a:prstGeom prst="rect">
             <a:avLst/>
@@ -1911,7 +1547,7 @@
           <a:fontRef idx="minor"/>
         </p:style>
         <p:txBody>
-          <a:bodyPr tIns="91440" bIns="91440" anchor="ctr">
+          <a:bodyPr lIns="90000" rIns="90000" tIns="91440" bIns="91440" anchor="ctr">
             <a:noAutofit/>
           </a:bodyPr>
           <a:p>
@@ -1938,14 +1574,14 @@
       </p:sp>
       <p:sp>
         <p:nvSpPr>
-          <p:cNvPr id="41" name="CustomShape 3"/>
+          <p:cNvPr id="39" name="CustomShape 3"/>
           <p:cNvSpPr/>
           <p:nvPr/>
         </p:nvSpPr>
         <p:spPr>
           <a:xfrm>
             <a:off x="5296680" y="383400"/>
-            <a:ext cx="1307520" cy="597240"/>
+            <a:ext cx="1307160" cy="596880"/>
           </a:xfrm>
           <a:prstGeom prst="rect">
             <a:avLst/>
@@ -1964,7 +1600,7 @@
           <a:fontRef idx="minor"/>
         </p:style>
         <p:txBody>
-          <a:bodyPr tIns="91440" bIns="91440" anchor="ctr">
+          <a:bodyPr lIns="90000" rIns="90000" tIns="91440" bIns="91440" anchor="ctr">
             <a:noAutofit/>
           </a:bodyPr>
           <a:p>
@@ -1991,14 +1627,14 @@
       </p:sp>
       <p:sp>
         <p:nvSpPr>
-          <p:cNvPr id="42" name="CustomShape 4"/>
+          <p:cNvPr id="40" name="CustomShape 4"/>
           <p:cNvSpPr/>
           <p:nvPr/>
         </p:nvSpPr>
         <p:spPr>
           <a:xfrm>
             <a:off x="184680" y="410760"/>
-            <a:ext cx="1307520" cy="597240"/>
+            <a:ext cx="1307160" cy="596880"/>
           </a:xfrm>
           <a:prstGeom prst="rect">
             <a:avLst/>
@@ -2017,7 +1653,7 @@
           <a:fontRef idx="minor"/>
         </p:style>
         <p:txBody>
-          <a:bodyPr tIns="91440" bIns="91440" anchor="ctr">
+          <a:bodyPr lIns="90000" rIns="90000" tIns="91440" bIns="91440" anchor="ctr">
             <a:noAutofit/>
           </a:bodyPr>
           <a:p>
@@ -2044,14 +1680,14 @@
       </p:sp>
       <p:sp>
         <p:nvSpPr>
-          <p:cNvPr id="43" name="CustomShape 5"/>
+          <p:cNvPr id="41" name="CustomShape 5"/>
           <p:cNvSpPr/>
           <p:nvPr/>
         </p:nvSpPr>
         <p:spPr>
           <a:xfrm>
             <a:off x="144000" y="2066760"/>
-            <a:ext cx="1307520" cy="597240"/>
+            <a:ext cx="1307160" cy="596880"/>
           </a:xfrm>
           <a:prstGeom prst="rect">
             <a:avLst/>
@@ -2070,7 +1706,7 @@
           <a:fontRef idx="minor"/>
         </p:style>
         <p:txBody>
-          <a:bodyPr tIns="91440" bIns="91440" anchor="ctr">
+          <a:bodyPr lIns="90000" rIns="90000" tIns="91440" bIns="91440" anchor="ctr">
             <a:noAutofit/>
           </a:bodyPr>
           <a:p>
@@ -2097,14 +1733,14 @@
       </p:sp>
       <p:sp>
         <p:nvSpPr>
-          <p:cNvPr id="44" name="CustomShape 6"/>
+          <p:cNvPr id="42" name="CustomShape 6"/>
           <p:cNvSpPr/>
           <p:nvPr/>
         </p:nvSpPr>
         <p:spPr>
           <a:xfrm>
             <a:off x="5296680" y="2088000"/>
-            <a:ext cx="1307520" cy="864000"/>
+            <a:ext cx="1307160" cy="863640"/>
           </a:xfrm>
           <a:prstGeom prst="rect">
             <a:avLst/>
@@ -2123,7 +1759,7 @@
           <a:fontRef idx="minor"/>
         </p:style>
         <p:txBody>
-          <a:bodyPr tIns="91440" bIns="91440" anchor="ctr">
+          <a:bodyPr lIns="90000" rIns="90000" tIns="91440" bIns="91440" anchor="ctr">
             <a:noAutofit/>
           </a:bodyPr>
           <a:p>
@@ -2182,14 +1818,14 @@
       </p:sp>
       <p:sp>
         <p:nvSpPr>
-          <p:cNvPr id="45" name="CustomShape 7"/>
+          <p:cNvPr id="43" name="CustomShape 7"/>
           <p:cNvSpPr/>
           <p:nvPr/>
         </p:nvSpPr>
         <p:spPr>
           <a:xfrm>
             <a:off x="3568680" y="360000"/>
-            <a:ext cx="1307520" cy="864000"/>
+            <a:ext cx="1307160" cy="863640"/>
           </a:xfrm>
           <a:prstGeom prst="rect">
             <a:avLst/>
@@ -2208,7 +1844,7 @@
           <a:fontRef idx="minor"/>
         </p:style>
         <p:txBody>
-          <a:bodyPr tIns="91440" bIns="91440" anchor="ctr">
+          <a:bodyPr lIns="90000" rIns="90000" tIns="91440" bIns="91440" anchor="ctr">
             <a:noAutofit/>
           </a:bodyPr>
           <a:p>
@@ -2267,14 +1903,182 @@
       </p:sp>
       <p:sp>
         <p:nvSpPr>
-          <p:cNvPr id="46" name="CustomShape 8"/>
+          <p:cNvPr id="44" name="Line 8"/>
           <p:cNvSpPr/>
           <p:nvPr/>
         </p:nvSpPr>
         <p:spPr>
           <a:xfrm>
-            <a:off x="7620480" y="3240000"/>
-            <a:ext cx="1307520" cy="1080000"/>
+            <a:off x="1492200" y="720000"/>
+            <a:ext cx="282600" cy="0"/>
+          </a:xfrm>
+          <a:prstGeom prst="line">
+            <a:avLst/>
+          </a:prstGeom>
+          <a:ln>
+            <a:solidFill>
+              <a:srgbClr val="000000"/>
+            </a:solidFill>
+            <a:tailEnd len="med" type="triangle" w="med"/>
+          </a:ln>
+        </p:spPr>
+        <p:style>
+          <a:lnRef idx="0"/>
+          <a:fillRef idx="0"/>
+          <a:effectRef idx="0"/>
+          <a:fontRef idx="minor"/>
+        </p:style>
+      </p:sp>
+      <p:sp>
+        <p:nvSpPr>
+          <p:cNvPr id="45" name="Line 9"/>
+          <p:cNvSpPr/>
+          <p:nvPr/>
+        </p:nvSpPr>
+        <p:spPr>
+          <a:xfrm>
+            <a:off x="3082320" y="720000"/>
+            <a:ext cx="486360" cy="0"/>
+          </a:xfrm>
+          <a:prstGeom prst="line">
+            <a:avLst/>
+          </a:prstGeom>
+          <a:ln>
+            <a:solidFill>
+              <a:srgbClr val="000000"/>
+            </a:solidFill>
+            <a:tailEnd len="med" type="triangle" w="med"/>
+          </a:ln>
+        </p:spPr>
+        <p:style>
+          <a:lnRef idx="0"/>
+          <a:fillRef idx="0"/>
+          <a:effectRef idx="0"/>
+          <a:fontRef idx="minor"/>
+        </p:style>
+      </p:sp>
+      <p:sp>
+        <p:nvSpPr>
+          <p:cNvPr id="46" name="Line 10"/>
+          <p:cNvSpPr/>
+          <p:nvPr/>
+        </p:nvSpPr>
+        <p:spPr>
+          <a:xfrm>
+            <a:off x="4876200" y="720000"/>
+            <a:ext cx="420480" cy="0"/>
+          </a:xfrm>
+          <a:prstGeom prst="line">
+            <a:avLst/>
+          </a:prstGeom>
+          <a:ln>
+            <a:solidFill>
+              <a:srgbClr val="000000"/>
+            </a:solidFill>
+            <a:tailEnd len="med" type="triangle" w="med"/>
+          </a:ln>
+        </p:spPr>
+        <p:style>
+          <a:lnRef idx="0"/>
+          <a:fillRef idx="0"/>
+          <a:effectRef idx="0"/>
+          <a:fontRef idx="minor"/>
+        </p:style>
+      </p:sp>
+      <p:sp>
+        <p:nvSpPr>
+          <p:cNvPr id="47" name="Line 11"/>
+          <p:cNvSpPr/>
+          <p:nvPr/>
+        </p:nvSpPr>
+        <p:spPr>
+          <a:xfrm>
+            <a:off x="6604200" y="648000"/>
+            <a:ext cx="801720" cy="0"/>
+          </a:xfrm>
+          <a:prstGeom prst="line">
+            <a:avLst/>
+          </a:prstGeom>
+          <a:ln>
+            <a:solidFill>
+              <a:srgbClr val="000000"/>
+            </a:solidFill>
+            <a:tailEnd len="med" type="triangle" w="med"/>
+          </a:ln>
+        </p:spPr>
+        <p:style>
+          <a:lnRef idx="0"/>
+          <a:fillRef idx="0"/>
+          <a:effectRef idx="0"/>
+          <a:fontRef idx="minor"/>
+        </p:style>
+      </p:sp>
+      <p:sp>
+        <p:nvSpPr>
+          <p:cNvPr id="48" name="Line 12"/>
+          <p:cNvSpPr/>
+          <p:nvPr/>
+        </p:nvSpPr>
+        <p:spPr>
+          <a:xfrm>
+            <a:off x="1451520" y="2376000"/>
+            <a:ext cx="3845160" cy="0"/>
+          </a:xfrm>
+          <a:prstGeom prst="line">
+            <a:avLst/>
+          </a:prstGeom>
+          <a:ln>
+            <a:solidFill>
+              <a:srgbClr val="000000"/>
+            </a:solidFill>
+            <a:tailEnd len="med" type="triangle" w="med"/>
+          </a:ln>
+        </p:spPr>
+        <p:style>
+          <a:lnRef idx="0"/>
+          <a:fillRef idx="0"/>
+          <a:effectRef idx="0"/>
+          <a:fontRef idx="minor"/>
+        </p:style>
+      </p:sp>
+      <p:sp>
+        <p:nvSpPr>
+          <p:cNvPr id="49" name="Line 13"/>
+          <p:cNvSpPr/>
+          <p:nvPr/>
+        </p:nvSpPr>
+        <p:spPr>
+          <a:xfrm flipV="1">
+            <a:off x="5976000" y="980640"/>
+            <a:ext cx="0" cy="1107360"/>
+          </a:xfrm>
+          <a:prstGeom prst="line">
+            <a:avLst/>
+          </a:prstGeom>
+          <a:ln>
+            <a:solidFill>
+              <a:srgbClr val="000000"/>
+            </a:solidFill>
+            <a:tailEnd len="med" type="triangle" w="med"/>
+          </a:ln>
+        </p:spPr>
+        <p:style>
+          <a:lnRef idx="0"/>
+          <a:fillRef idx="0"/>
+          <a:effectRef idx="0"/>
+          <a:fontRef idx="minor"/>
+        </p:style>
+      </p:sp>
+      <p:sp>
+        <p:nvSpPr>
+          <p:cNvPr id="50" name="CustomShape 14"/>
+          <p:cNvSpPr/>
+          <p:nvPr/>
+        </p:nvSpPr>
+        <p:spPr>
+          <a:xfrm>
+            <a:off x="7620840" y="2880000"/>
+            <a:ext cx="1307160" cy="1152000"/>
           </a:xfrm>
           <a:prstGeom prst="rect">
             <a:avLst/>
@@ -2293,7 +2097,90 @@
           <a:fontRef idx="minor"/>
         </p:style>
         <p:txBody>
-          <a:bodyPr tIns="91440" bIns="91440" anchor="ctr">
+          <a:bodyPr lIns="90000" rIns="90000" tIns="91440" bIns="91440" anchor="ctr">
+            <a:noAutofit/>
+          </a:bodyPr>
+          <a:p>
+            <a:pPr algn="ctr">
+              <a:lnSpc>
+                <a:spcPct val="100000"/>
+              </a:lnSpc>
+            </a:pPr>
+            <a:r>
+              <a:rPr b="1" lang="en" sz="1000" spc="-1" strike="noStrike">
+                <a:solidFill>
+                  <a:srgbClr val="000000"/>
+                </a:solidFill>
+                <a:latin typeface="Arial"/>
+                <a:ea typeface="Arial"/>
+              </a:rPr>
+              <a:t>CloudWatch</a:t>
+            </a:r>
+            <a:r>
+              <a:rPr b="0" lang="en" sz="1000" spc="-1" strike="noStrike">
+                <a:solidFill>
+                  <a:srgbClr val="000000"/>
+                </a:solidFill>
+                <a:latin typeface="Arial"/>
+                <a:ea typeface="Arial"/>
+              </a:rPr>
+              <a:t> with </a:t>
+            </a:r>
+            <a:r>
+              <a:rPr b="1" lang="en" sz="1000" spc="-1" strike="noStrike">
+                <a:solidFill>
+                  <a:srgbClr val="000000"/>
+                </a:solidFill>
+                <a:latin typeface="Arial"/>
+                <a:ea typeface="Arial"/>
+              </a:rPr>
+              <a:t>Lamda</a:t>
+            </a:r>
+            <a:r>
+              <a:rPr b="0" lang="en" sz="1000" spc="-1" strike="noStrike">
+                <a:solidFill>
+                  <a:srgbClr val="000000"/>
+                </a:solidFill>
+                <a:latin typeface="Arial"/>
+                <a:ea typeface="Arial"/>
+              </a:rPr>
+              <a:t> to catch events and execute remediation actions</a:t>
+            </a:r>
+            <a:endParaRPr b="0" lang="de-DE" sz="1000" spc="-1" strike="noStrike">
+              <a:latin typeface="Arial"/>
+            </a:endParaRPr>
+          </a:p>
+        </p:txBody>
+      </p:sp>
+      <p:sp>
+        <p:nvSpPr>
+          <p:cNvPr id="51" name="CustomShape 15"/>
+          <p:cNvSpPr/>
+          <p:nvPr/>
+        </p:nvSpPr>
+        <p:spPr>
+          <a:xfrm>
+            <a:off x="7620480" y="1440000"/>
+            <a:ext cx="1307160" cy="1152000"/>
+          </a:xfrm>
+          <a:prstGeom prst="rect">
+            <a:avLst/>
+          </a:prstGeom>
+          <a:solidFill>
+            <a:srgbClr val="81d41a"/>
+          </a:solidFill>
+          <a:ln>
+            <a:noFill/>
+          </a:ln>
+        </p:spPr>
+        <p:style>
+          <a:lnRef idx="0"/>
+          <a:fillRef idx="0"/>
+          <a:effectRef idx="0"/>
+          <a:fontRef idx="minor"/>
+        </p:style>
+        <p:txBody>
+          <a:bodyPr lIns="90000" rIns="90000" tIns="91440" bIns="91440" anchor="ctr">
             <a:noAutofit/>
           </a:bodyPr>
           <a:p>
@@ -2352,14 +2239,77 @@
       </p:sp>
       <p:sp>
         <p:nvSpPr>
-          <p:cNvPr id="47" name="Line 9"/>
+          <p:cNvPr id="52" name="CustomShape 16"/>
           <p:cNvSpPr/>
           <p:nvPr/>
         </p:nvSpPr>
         <p:spPr>
           <a:xfrm>
-            <a:off x="8260200" y="957240"/>
-            <a:ext cx="19800" cy="2282760"/>
+            <a:off x="7632000" y="4176000"/>
+            <a:ext cx="1307160" cy="832320"/>
+          </a:xfrm>
+          <a:prstGeom prst="rect">
+            <a:avLst/>
+          </a:prstGeom>
+          <a:solidFill>
+            <a:srgbClr val="81d41a"/>
+          </a:solidFill>
+          <a:ln>
+            <a:noFill/>
+          </a:ln>
+        </p:spPr>
+        <p:style>
+          <a:lnRef idx="0"/>
+          <a:fillRef idx="0"/>
+          <a:effectRef idx="0"/>
+          <a:fontRef idx="minor"/>
+        </p:style>
+        <p:txBody>
+          <a:bodyPr lIns="90000" rIns="90000" tIns="91440" bIns="91440" anchor="ctr">
+            <a:noAutofit/>
+          </a:bodyPr>
+          <a:p>
+            <a:pPr algn="ctr">
+              <a:lnSpc>
+                <a:spcPct val="100000"/>
+              </a:lnSpc>
+            </a:pPr>
+            <a:r>
+              <a:rPr b="1" lang="en" sz="1000" spc="-1" strike="noStrike">
+                <a:solidFill>
+                  <a:srgbClr val="000000"/>
+                </a:solidFill>
+                <a:latin typeface="Arial"/>
+                <a:ea typeface="Arial"/>
+              </a:rPr>
+              <a:t>JIRA</a:t>
+            </a:r>
+            <a:r>
+              <a:rPr b="0" lang="en" sz="1000" spc="-1" strike="noStrike">
+                <a:solidFill>
+                  <a:srgbClr val="000000"/>
+                </a:solidFill>
+                <a:latin typeface="Arial"/>
+                <a:ea typeface="Arial"/>
+              </a:rPr>
+              <a:t> where tickets will be automatically raised</a:t>
+            </a:r>
+            <a:endParaRPr b="0" lang="de-DE" sz="1000" spc="-1" strike="noStrike">
+              <a:latin typeface="Arial"/>
+            </a:endParaRPr>
+          </a:p>
+        </p:txBody>
+      </p:sp>
+      <p:sp>
+        <p:nvSpPr>
+          <p:cNvPr id="53" name="Line 17"/>
+          <p:cNvSpPr/>
+          <p:nvPr/>
+        </p:nvSpPr>
+        <p:spPr>
+          <a:xfrm>
+            <a:off x="8280000" y="2592000"/>
+            <a:ext cx="0" cy="288000"/>
           </a:xfrm>
           <a:prstGeom prst="line">
             <a:avLst/>
@@ -2380,14 +2330,14 @@
       </p:sp>
       <p:sp>
         <p:nvSpPr>
-          <p:cNvPr id="48" name="Line 10"/>
+          <p:cNvPr id="54" name="Line 18"/>
           <p:cNvSpPr/>
           <p:nvPr/>
         </p:nvSpPr>
         <p:spPr>
           <a:xfrm>
-            <a:off x="1492200" y="720000"/>
-            <a:ext cx="282600" cy="0"/>
+            <a:off x="8280000" y="956880"/>
+            <a:ext cx="0" cy="483120"/>
           </a:xfrm>
           <a:prstGeom prst="line">
             <a:avLst/>
@@ -2408,126 +2358,14 @@
       </p:sp>
       <p:sp>
         <p:nvSpPr>
-          <p:cNvPr id="49" name="Line 11"/>
+          <p:cNvPr id="55" name="Line 19"/>
           <p:cNvSpPr/>
           <p:nvPr/>
         </p:nvSpPr>
         <p:spPr>
           <a:xfrm>
-            <a:off x="3082320" y="720000"/>
-            <a:ext cx="486360" cy="0"/>
-          </a:xfrm>
-          <a:prstGeom prst="line">
-            <a:avLst/>
-          </a:prstGeom>
-          <a:ln>
-            <a:solidFill>
-              <a:srgbClr val="000000"/>
-            </a:solidFill>
-            <a:tailEnd len="med" type="triangle" w="med"/>
-          </a:ln>
-        </p:spPr>
-        <p:style>
-          <a:lnRef idx="0"/>
-          <a:fillRef idx="0"/>
-          <a:effectRef idx="0"/>
-          <a:fontRef idx="minor"/>
-        </p:style>
-      </p:sp>
-      <p:sp>
-        <p:nvSpPr>
-          <p:cNvPr id="50" name="Line 12"/>
-          <p:cNvSpPr/>
-          <p:nvPr/>
-        </p:nvSpPr>
-        <p:spPr>
-          <a:xfrm>
-            <a:off x="4876200" y="720000"/>
-            <a:ext cx="420480" cy="0"/>
-          </a:xfrm>
-          <a:prstGeom prst="line">
-            <a:avLst/>
-          </a:prstGeom>
-          <a:ln>
-            <a:solidFill>
-              <a:srgbClr val="000000"/>
-            </a:solidFill>
-            <a:tailEnd len="med" type="triangle" w="med"/>
-          </a:ln>
-        </p:spPr>
-        <p:style>
-          <a:lnRef idx="0"/>
-          <a:fillRef idx="0"/>
-          <a:effectRef idx="0"/>
-          <a:fontRef idx="minor"/>
-        </p:style>
-      </p:sp>
-      <p:sp>
-        <p:nvSpPr>
-          <p:cNvPr id="51" name="Line 13"/>
-          <p:cNvSpPr/>
-          <p:nvPr/>
-        </p:nvSpPr>
-        <p:spPr>
-          <a:xfrm>
-            <a:off x="6604200" y="648000"/>
-            <a:ext cx="801720" cy="0"/>
-          </a:xfrm>
-          <a:prstGeom prst="line">
-            <a:avLst/>
-          </a:prstGeom>
-          <a:ln>
-            <a:solidFill>
-              <a:srgbClr val="000000"/>
-            </a:solidFill>
-            <a:tailEnd len="med" type="triangle" w="med"/>
-          </a:ln>
-        </p:spPr>
-        <p:style>
-          <a:lnRef idx="0"/>
-          <a:fillRef idx="0"/>
-          <a:effectRef idx="0"/>
-          <a:fontRef idx="minor"/>
-        </p:style>
-      </p:sp>
-      <p:sp>
-        <p:nvSpPr>
-          <p:cNvPr id="52" name="Line 14"/>
-          <p:cNvSpPr/>
-          <p:nvPr/>
-        </p:nvSpPr>
-        <p:spPr>
-          <a:xfrm>
-            <a:off x="1451520" y="2376000"/>
-            <a:ext cx="3845160" cy="0"/>
-          </a:xfrm>
-          <a:prstGeom prst="line">
-            <a:avLst/>
-          </a:prstGeom>
-          <a:ln>
-            <a:solidFill>
-              <a:srgbClr val="000000"/>
-            </a:solidFill>
-            <a:tailEnd len="med" type="triangle" w="med"/>
-          </a:ln>
-        </p:spPr>
-        <p:style>
-          <a:lnRef idx="0"/>
-          <a:fillRef idx="0"/>
-          <a:effectRef idx="0"/>
-          <a:fontRef idx="minor"/>
-        </p:style>
-      </p:sp>
-      <p:sp>
-        <p:nvSpPr>
-          <p:cNvPr id="53" name="Line 15"/>
-          <p:cNvSpPr/>
-          <p:nvPr/>
-        </p:nvSpPr>
-        <p:spPr>
-          <a:xfrm flipV="1">
-            <a:off x="5976000" y="980640"/>
-            <a:ext cx="0" cy="1107360"/>
+            <a:off x="8280000" y="4032000"/>
+            <a:ext cx="0" cy="216000"/>
           </a:xfrm>
           <a:prstGeom prst="line">
             <a:avLst/>

</xml_diff>